<commit_message>
Updating documentation, gantt and powerpoints
</commit_message>
<xml_diff>
--- a/Docs/Scrum management for Group Project.pptx
+++ b/Docs/Scrum management for Group Project.pptx
@@ -5,7 +5,7 @@
     <p:sldMasterId id="2147483659" r:id="rId1"/>
   </p:sldMasterIdLst>
   <p:notesMasterIdLst>
-    <p:notesMasterId r:id="rId9"/>
+    <p:notesMasterId r:id="rId11"/>
   </p:notesMasterIdLst>
   <p:sldIdLst>
     <p:sldId id="256" r:id="rId2"/>
@@ -14,7 +14,9 @@
     <p:sldId id="259" r:id="rId5"/>
     <p:sldId id="260" r:id="rId6"/>
     <p:sldId id="261" r:id="rId7"/>
-    <p:sldId id="262" r:id="rId8"/>
+    <p:sldId id="263" r:id="rId8"/>
+    <p:sldId id="262" r:id="rId9"/>
+    <p:sldId id="264" r:id="rId10"/>
   </p:sldIdLst>
   <p:sldSz cx="9144000" cy="5143500" type="screen16x9"/>
   <p:notesSz cx="6858000" cy="9144000"/>
@@ -247,6 +249,11 @@
       </a:defRPr>
     </a:lvl9pPr>
   </p:defaultTextStyle>
+  <p:extLst>
+    <p:ext uri="{EFAFB233-063F-42B5-8137-9DF3F51BA10A}">
+      <p15:sldGuideLst xmlns:p15="http://schemas.microsoft.com/office/powerpoint/2012/main"/>
+    </p:ext>
+  </p:extLst>
 </p:presentation>
 </file>
 
@@ -12245,21 +12252,26 @@
             <a:pPr marL="285750" indent="-285750"/>
             <a:r>
               <a:rPr lang="en-GB" dirty="0" smtClean="0"/>
-              <a:t>Speech to text and text to speech is not possible to incorporate so have been advised by sponsor to remove feature </a:t>
+              <a:t>Speech to text </a:t>
+            </a:r>
+            <a:r>
+              <a:rPr lang="en-GB" dirty="0" smtClean="0"/>
+              <a:t>is </a:t>
+            </a:r>
+            <a:r>
+              <a:rPr lang="en-GB" dirty="0" smtClean="0"/>
+              <a:t>not possible to incorporate so have been advised by sponsor to remove feature </a:t>
             </a:r>
           </a:p>
           <a:p>
             <a:pPr marL="285750" indent="-285750"/>
             <a:r>
               <a:rPr lang="en-GB" dirty="0" smtClean="0"/>
-              <a:t>Animation fitted to avatar </a:t>
+              <a:t>Blogs </a:t>
             </a:r>
-          </a:p>
-          <a:p>
-            <a:pPr marL="285750" indent="-285750"/>
             <a:r>
               <a:rPr lang="en-GB" dirty="0" smtClean="0"/>
-              <a:t>Blogs are now up to date with current progress </a:t>
+              <a:t>are now up to date with current progress </a:t>
             </a:r>
           </a:p>
         </p:txBody>
@@ -12278,6 +12290,1292 @@
 </file>
 
 <file path=ppt/slides/slide7.xml><?xml version="1.0" encoding="utf-8"?>
+<p:sld xmlns:a="http://schemas.openxmlformats.org/drawingml/2006/main" xmlns:r="http://schemas.openxmlformats.org/officeDocument/2006/relationships" xmlns:p="http://schemas.openxmlformats.org/presentationml/2006/main">
+  <p:cSld>
+    <p:spTree>
+      <p:nvGrpSpPr>
+        <p:cNvPr id="1" name=""/>
+        <p:cNvGrpSpPr/>
+        <p:nvPr/>
+      </p:nvGrpSpPr>
+      <p:grpSpPr>
+        <a:xfrm>
+          <a:off x="0" y="0"/>
+          <a:ext cx="0" cy="0"/>
+          <a:chOff x="0" y="0"/>
+          <a:chExt cx="0" cy="0"/>
+        </a:xfrm>
+      </p:grpSpPr>
+      <p:sp>
+        <p:nvSpPr>
+          <p:cNvPr id="4" name="Shape 165"/>
+          <p:cNvSpPr txBox="1">
+            <a:spLocks/>
+          </p:cNvSpPr>
+          <p:nvPr/>
+        </p:nvSpPr>
+        <p:spPr>
+          <a:xfrm>
+            <a:off x="311700" y="1307850"/>
+            <a:ext cx="4156800" cy="1710923"/>
+          </a:xfrm>
+          <a:prstGeom prst="rect">
+            <a:avLst/>
+          </a:prstGeom>
+          <a:noFill/>
+          <a:ln>
+            <a:noFill/>
+          </a:ln>
+        </p:spPr>
+        <p:txBody>
+          <a:bodyPr spcFirstLastPara="1" wrap="square" lIns="91425" tIns="91425" rIns="91425" bIns="91425" anchor="t" anchorCtr="0">
+            <a:noAutofit/>
+          </a:bodyPr>
+          <a:lstStyle>
+            <a:defPPr marR="0" lvl="0" algn="l" rtl="0">
+              <a:lnSpc>
+                <a:spcPct val="100000"/>
+              </a:lnSpc>
+              <a:spcBef>
+                <a:spcPts val="0"/>
+              </a:spcBef>
+              <a:spcAft>
+                <a:spcPts val="0"/>
+              </a:spcAft>
+            </a:defPPr>
+            <a:lvl1pPr marL="457200" marR="0" lvl="0" indent="-311150" algn="l" rtl="0">
+              <a:lnSpc>
+                <a:spcPct val="115000"/>
+              </a:lnSpc>
+              <a:spcBef>
+                <a:spcPts val="0"/>
+              </a:spcBef>
+              <a:spcAft>
+                <a:spcPts val="0"/>
+              </a:spcAft>
+              <a:buClr>
+                <a:schemeClr val="lt1"/>
+              </a:buClr>
+              <a:buSzPts val="1300"/>
+              <a:buFont typeface="Lato"/>
+              <a:buChar char="●"/>
+              <a:defRPr sz="1300" b="0" i="0" u="none" strike="noStrike" cap="none">
+                <a:solidFill>
+                  <a:schemeClr val="lt1"/>
+                </a:solidFill>
+                <a:latin typeface="Lato"/>
+                <a:ea typeface="Lato"/>
+                <a:cs typeface="Lato"/>
+                <a:sym typeface="Lato"/>
+              </a:defRPr>
+            </a:lvl1pPr>
+            <a:lvl2pPr marL="914400" marR="0" lvl="1" indent="-298450" algn="l" rtl="0">
+              <a:lnSpc>
+                <a:spcPct val="115000"/>
+              </a:lnSpc>
+              <a:spcBef>
+                <a:spcPts val="1600"/>
+              </a:spcBef>
+              <a:spcAft>
+                <a:spcPts val="0"/>
+              </a:spcAft>
+              <a:buClr>
+                <a:schemeClr val="lt1"/>
+              </a:buClr>
+              <a:buSzPts val="1100"/>
+              <a:buFont typeface="Lato"/>
+              <a:buChar char="○"/>
+              <a:defRPr sz="1100" b="0" i="0" u="none" strike="noStrike" cap="none">
+                <a:solidFill>
+                  <a:schemeClr val="lt1"/>
+                </a:solidFill>
+                <a:latin typeface="Lato"/>
+                <a:ea typeface="Lato"/>
+                <a:cs typeface="Lato"/>
+                <a:sym typeface="Lato"/>
+              </a:defRPr>
+            </a:lvl2pPr>
+            <a:lvl3pPr marL="1371600" marR="0" lvl="2" indent="-298450" algn="l" rtl="0">
+              <a:lnSpc>
+                <a:spcPct val="115000"/>
+              </a:lnSpc>
+              <a:spcBef>
+                <a:spcPts val="1600"/>
+              </a:spcBef>
+              <a:spcAft>
+                <a:spcPts val="0"/>
+              </a:spcAft>
+              <a:buClr>
+                <a:schemeClr val="lt1"/>
+              </a:buClr>
+              <a:buSzPts val="1100"/>
+              <a:buFont typeface="Lato"/>
+              <a:buChar char="■"/>
+              <a:defRPr sz="1100" b="0" i="0" u="none" strike="noStrike" cap="none">
+                <a:solidFill>
+                  <a:schemeClr val="lt1"/>
+                </a:solidFill>
+                <a:latin typeface="Lato"/>
+                <a:ea typeface="Lato"/>
+                <a:cs typeface="Lato"/>
+                <a:sym typeface="Lato"/>
+              </a:defRPr>
+            </a:lvl3pPr>
+            <a:lvl4pPr marL="1828800" marR="0" lvl="3" indent="-298450" algn="l" rtl="0">
+              <a:lnSpc>
+                <a:spcPct val="115000"/>
+              </a:lnSpc>
+              <a:spcBef>
+                <a:spcPts val="1600"/>
+              </a:spcBef>
+              <a:spcAft>
+                <a:spcPts val="0"/>
+              </a:spcAft>
+              <a:buClr>
+                <a:schemeClr val="lt1"/>
+              </a:buClr>
+              <a:buSzPts val="1100"/>
+              <a:buFont typeface="Lato"/>
+              <a:buChar char="●"/>
+              <a:defRPr sz="1100" b="0" i="0" u="none" strike="noStrike" cap="none">
+                <a:solidFill>
+                  <a:schemeClr val="lt1"/>
+                </a:solidFill>
+                <a:latin typeface="Lato"/>
+                <a:ea typeface="Lato"/>
+                <a:cs typeface="Lato"/>
+                <a:sym typeface="Lato"/>
+              </a:defRPr>
+            </a:lvl4pPr>
+            <a:lvl5pPr marL="2286000" marR="0" lvl="4" indent="-298450" algn="l" rtl="0">
+              <a:lnSpc>
+                <a:spcPct val="115000"/>
+              </a:lnSpc>
+              <a:spcBef>
+                <a:spcPts val="1600"/>
+              </a:spcBef>
+              <a:spcAft>
+                <a:spcPts val="0"/>
+              </a:spcAft>
+              <a:buClr>
+                <a:schemeClr val="lt1"/>
+              </a:buClr>
+              <a:buSzPts val="1100"/>
+              <a:buFont typeface="Lato"/>
+              <a:buChar char="○"/>
+              <a:defRPr sz="1100" b="0" i="0" u="none" strike="noStrike" cap="none">
+                <a:solidFill>
+                  <a:schemeClr val="lt1"/>
+                </a:solidFill>
+                <a:latin typeface="Lato"/>
+                <a:ea typeface="Lato"/>
+                <a:cs typeface="Lato"/>
+                <a:sym typeface="Lato"/>
+              </a:defRPr>
+            </a:lvl5pPr>
+            <a:lvl6pPr marL="2743200" marR="0" lvl="5" indent="-298450" algn="l" rtl="0">
+              <a:lnSpc>
+                <a:spcPct val="115000"/>
+              </a:lnSpc>
+              <a:spcBef>
+                <a:spcPts val="1600"/>
+              </a:spcBef>
+              <a:spcAft>
+                <a:spcPts val="0"/>
+              </a:spcAft>
+              <a:buClr>
+                <a:schemeClr val="lt1"/>
+              </a:buClr>
+              <a:buSzPts val="1100"/>
+              <a:buFont typeface="Lato"/>
+              <a:buChar char="■"/>
+              <a:defRPr sz="1100" b="0" i="0" u="none" strike="noStrike" cap="none">
+                <a:solidFill>
+                  <a:schemeClr val="lt1"/>
+                </a:solidFill>
+                <a:latin typeface="Lato"/>
+                <a:ea typeface="Lato"/>
+                <a:cs typeface="Lato"/>
+                <a:sym typeface="Lato"/>
+              </a:defRPr>
+            </a:lvl6pPr>
+            <a:lvl7pPr marL="3200400" marR="0" lvl="6" indent="-298450" algn="l" rtl="0">
+              <a:lnSpc>
+                <a:spcPct val="115000"/>
+              </a:lnSpc>
+              <a:spcBef>
+                <a:spcPts val="1600"/>
+              </a:spcBef>
+              <a:spcAft>
+                <a:spcPts val="0"/>
+              </a:spcAft>
+              <a:buClr>
+                <a:schemeClr val="lt1"/>
+              </a:buClr>
+              <a:buSzPts val="1100"/>
+              <a:buFont typeface="Lato"/>
+              <a:buChar char="●"/>
+              <a:defRPr sz="1100" b="0" i="0" u="none" strike="noStrike" cap="none">
+                <a:solidFill>
+                  <a:schemeClr val="lt1"/>
+                </a:solidFill>
+                <a:latin typeface="Lato"/>
+                <a:ea typeface="Lato"/>
+                <a:cs typeface="Lato"/>
+                <a:sym typeface="Lato"/>
+              </a:defRPr>
+            </a:lvl7pPr>
+            <a:lvl8pPr marL="3657600" marR="0" lvl="7" indent="-298450" algn="l" rtl="0">
+              <a:lnSpc>
+                <a:spcPct val="115000"/>
+              </a:lnSpc>
+              <a:spcBef>
+                <a:spcPts val="1600"/>
+              </a:spcBef>
+              <a:spcAft>
+                <a:spcPts val="0"/>
+              </a:spcAft>
+              <a:buClr>
+                <a:schemeClr val="lt1"/>
+              </a:buClr>
+              <a:buSzPts val="1100"/>
+              <a:buFont typeface="Lato"/>
+              <a:buChar char="○"/>
+              <a:defRPr sz="1100" b="0" i="0" u="none" strike="noStrike" cap="none">
+                <a:solidFill>
+                  <a:schemeClr val="lt1"/>
+                </a:solidFill>
+                <a:latin typeface="Lato"/>
+                <a:ea typeface="Lato"/>
+                <a:cs typeface="Lato"/>
+                <a:sym typeface="Lato"/>
+              </a:defRPr>
+            </a:lvl8pPr>
+            <a:lvl9pPr marL="4114800" marR="0" lvl="8" indent="-298450" algn="l" rtl="0">
+              <a:lnSpc>
+                <a:spcPct val="115000"/>
+              </a:lnSpc>
+              <a:spcBef>
+                <a:spcPts val="1600"/>
+              </a:spcBef>
+              <a:spcAft>
+                <a:spcPts val="1600"/>
+              </a:spcAft>
+              <a:buClr>
+                <a:schemeClr val="lt1"/>
+              </a:buClr>
+              <a:buSzPts val="1100"/>
+              <a:buFont typeface="Lato"/>
+              <a:buChar char="■"/>
+              <a:defRPr sz="1100" b="0" i="0" u="none" strike="noStrike" cap="none">
+                <a:solidFill>
+                  <a:schemeClr val="lt1"/>
+                </a:solidFill>
+                <a:latin typeface="Lato"/>
+                <a:ea typeface="Lato"/>
+                <a:cs typeface="Lato"/>
+                <a:sym typeface="Lato"/>
+              </a:defRPr>
+            </a:lvl9pPr>
+          </a:lstStyle>
+          <a:p>
+            <a:pPr marL="0" indent="0">
+              <a:buFont typeface="Lato"/>
+              <a:buNone/>
+            </a:pPr>
+            <a:r>
+              <a:rPr lang="en-GB" dirty="0" smtClean="0"/>
+              <a:t>Objectives for the week: </a:t>
+            </a:r>
+          </a:p>
+          <a:p>
+            <a:pPr marL="285750" indent="-285750"/>
+            <a:r>
+              <a:rPr lang="en-GB" dirty="0" smtClean="0"/>
+              <a:t>Continue working on animation for the </a:t>
+            </a:r>
+            <a:r>
+              <a:rPr lang="en-GB" dirty="0"/>
+              <a:t>avatar </a:t>
+            </a:r>
+            <a:endParaRPr lang="en-GB" dirty="0" smtClean="0"/>
+          </a:p>
+          <a:p>
+            <a:pPr marL="285750" indent="-285750"/>
+            <a:r>
+              <a:rPr lang="en-GB" dirty="0" smtClean="0"/>
+              <a:t>Develop a demo Watson </a:t>
+            </a:r>
+            <a:r>
+              <a:rPr lang="en-GB" dirty="0" smtClean="0"/>
+              <a:t>personality service </a:t>
+            </a:r>
+            <a:endParaRPr lang="en-GB" dirty="0" smtClean="0"/>
+          </a:p>
+          <a:p>
+            <a:pPr marL="285750" indent="-285750"/>
+            <a:r>
+              <a:rPr lang="en-GB" dirty="0" smtClean="0"/>
+              <a:t>Develop a demo for text to speech</a:t>
+            </a:r>
+            <a:endParaRPr lang="en-GB" dirty="0" smtClean="0"/>
+          </a:p>
+          <a:p>
+            <a:pPr marL="0" indent="0">
+              <a:spcBef>
+                <a:spcPts val="1600"/>
+              </a:spcBef>
+              <a:spcAft>
+                <a:spcPts val="1600"/>
+              </a:spcAft>
+              <a:buFont typeface="Lato"/>
+              <a:buNone/>
+            </a:pPr>
+            <a:endParaRPr lang="en-GB" dirty="0"/>
+          </a:p>
+        </p:txBody>
+      </p:sp>
+      <p:sp>
+        <p:nvSpPr>
+          <p:cNvPr id="6" name="Shape 167"/>
+          <p:cNvSpPr txBox="1">
+            <a:spLocks/>
+          </p:cNvSpPr>
+          <p:nvPr/>
+        </p:nvSpPr>
+        <p:spPr>
+          <a:xfrm>
+            <a:off x="311700" y="3166775"/>
+            <a:ext cx="4156800" cy="1559100"/>
+          </a:xfrm>
+          <a:prstGeom prst="rect">
+            <a:avLst/>
+          </a:prstGeom>
+          <a:noFill/>
+          <a:ln>
+            <a:noFill/>
+          </a:ln>
+        </p:spPr>
+        <p:txBody>
+          <a:bodyPr spcFirstLastPara="1" wrap="square" lIns="91425" tIns="91425" rIns="91425" bIns="91425" anchor="t" anchorCtr="0">
+            <a:noAutofit/>
+          </a:bodyPr>
+          <a:lstStyle>
+            <a:defPPr marR="0" lvl="0" algn="l" rtl="0">
+              <a:lnSpc>
+                <a:spcPct val="100000"/>
+              </a:lnSpc>
+              <a:spcBef>
+                <a:spcPts val="0"/>
+              </a:spcBef>
+              <a:spcAft>
+                <a:spcPts val="0"/>
+              </a:spcAft>
+            </a:defPPr>
+            <a:lvl1pPr marL="457200" marR="0" lvl="0" indent="-311150" algn="l" rtl="0">
+              <a:lnSpc>
+                <a:spcPct val="115000"/>
+              </a:lnSpc>
+              <a:spcBef>
+                <a:spcPts val="0"/>
+              </a:spcBef>
+              <a:spcAft>
+                <a:spcPts val="0"/>
+              </a:spcAft>
+              <a:buClr>
+                <a:schemeClr val="lt1"/>
+              </a:buClr>
+              <a:buSzPts val="1300"/>
+              <a:buFont typeface="Lato"/>
+              <a:buChar char="●"/>
+              <a:defRPr sz="1300" b="0" i="0" u="none" strike="noStrike" cap="none">
+                <a:solidFill>
+                  <a:schemeClr val="lt1"/>
+                </a:solidFill>
+                <a:latin typeface="Lato"/>
+                <a:ea typeface="Lato"/>
+                <a:cs typeface="Lato"/>
+                <a:sym typeface="Lato"/>
+              </a:defRPr>
+            </a:lvl1pPr>
+            <a:lvl2pPr marL="914400" marR="0" lvl="1" indent="-298450" algn="l" rtl="0">
+              <a:lnSpc>
+                <a:spcPct val="115000"/>
+              </a:lnSpc>
+              <a:spcBef>
+                <a:spcPts val="1600"/>
+              </a:spcBef>
+              <a:spcAft>
+                <a:spcPts val="0"/>
+              </a:spcAft>
+              <a:buClr>
+                <a:schemeClr val="lt1"/>
+              </a:buClr>
+              <a:buSzPts val="1100"/>
+              <a:buFont typeface="Lato"/>
+              <a:buChar char="○"/>
+              <a:defRPr sz="1100" b="0" i="0" u="none" strike="noStrike" cap="none">
+                <a:solidFill>
+                  <a:schemeClr val="lt1"/>
+                </a:solidFill>
+                <a:latin typeface="Lato"/>
+                <a:ea typeface="Lato"/>
+                <a:cs typeface="Lato"/>
+                <a:sym typeface="Lato"/>
+              </a:defRPr>
+            </a:lvl2pPr>
+            <a:lvl3pPr marL="1371600" marR="0" lvl="2" indent="-298450" algn="l" rtl="0">
+              <a:lnSpc>
+                <a:spcPct val="115000"/>
+              </a:lnSpc>
+              <a:spcBef>
+                <a:spcPts val="1600"/>
+              </a:spcBef>
+              <a:spcAft>
+                <a:spcPts val="0"/>
+              </a:spcAft>
+              <a:buClr>
+                <a:schemeClr val="lt1"/>
+              </a:buClr>
+              <a:buSzPts val="1100"/>
+              <a:buFont typeface="Lato"/>
+              <a:buChar char="■"/>
+              <a:defRPr sz="1100" b="0" i="0" u="none" strike="noStrike" cap="none">
+                <a:solidFill>
+                  <a:schemeClr val="lt1"/>
+                </a:solidFill>
+                <a:latin typeface="Lato"/>
+                <a:ea typeface="Lato"/>
+                <a:cs typeface="Lato"/>
+                <a:sym typeface="Lato"/>
+              </a:defRPr>
+            </a:lvl3pPr>
+            <a:lvl4pPr marL="1828800" marR="0" lvl="3" indent="-298450" algn="l" rtl="0">
+              <a:lnSpc>
+                <a:spcPct val="115000"/>
+              </a:lnSpc>
+              <a:spcBef>
+                <a:spcPts val="1600"/>
+              </a:spcBef>
+              <a:spcAft>
+                <a:spcPts val="0"/>
+              </a:spcAft>
+              <a:buClr>
+                <a:schemeClr val="lt1"/>
+              </a:buClr>
+              <a:buSzPts val="1100"/>
+              <a:buFont typeface="Lato"/>
+              <a:buChar char="●"/>
+              <a:defRPr sz="1100" b="0" i="0" u="none" strike="noStrike" cap="none">
+                <a:solidFill>
+                  <a:schemeClr val="lt1"/>
+                </a:solidFill>
+                <a:latin typeface="Lato"/>
+                <a:ea typeface="Lato"/>
+                <a:cs typeface="Lato"/>
+                <a:sym typeface="Lato"/>
+              </a:defRPr>
+            </a:lvl4pPr>
+            <a:lvl5pPr marL="2286000" marR="0" lvl="4" indent="-298450" algn="l" rtl="0">
+              <a:lnSpc>
+                <a:spcPct val="115000"/>
+              </a:lnSpc>
+              <a:spcBef>
+                <a:spcPts val="1600"/>
+              </a:spcBef>
+              <a:spcAft>
+                <a:spcPts val="0"/>
+              </a:spcAft>
+              <a:buClr>
+                <a:schemeClr val="lt1"/>
+              </a:buClr>
+              <a:buSzPts val="1100"/>
+              <a:buFont typeface="Lato"/>
+              <a:buChar char="○"/>
+              <a:defRPr sz="1100" b="0" i="0" u="none" strike="noStrike" cap="none">
+                <a:solidFill>
+                  <a:schemeClr val="lt1"/>
+                </a:solidFill>
+                <a:latin typeface="Lato"/>
+                <a:ea typeface="Lato"/>
+                <a:cs typeface="Lato"/>
+                <a:sym typeface="Lato"/>
+              </a:defRPr>
+            </a:lvl5pPr>
+            <a:lvl6pPr marL="2743200" marR="0" lvl="5" indent="-298450" algn="l" rtl="0">
+              <a:lnSpc>
+                <a:spcPct val="115000"/>
+              </a:lnSpc>
+              <a:spcBef>
+                <a:spcPts val="1600"/>
+              </a:spcBef>
+              <a:spcAft>
+                <a:spcPts val="0"/>
+              </a:spcAft>
+              <a:buClr>
+                <a:schemeClr val="lt1"/>
+              </a:buClr>
+              <a:buSzPts val="1100"/>
+              <a:buFont typeface="Lato"/>
+              <a:buChar char="■"/>
+              <a:defRPr sz="1100" b="0" i="0" u="none" strike="noStrike" cap="none">
+                <a:solidFill>
+                  <a:schemeClr val="lt1"/>
+                </a:solidFill>
+                <a:latin typeface="Lato"/>
+                <a:ea typeface="Lato"/>
+                <a:cs typeface="Lato"/>
+                <a:sym typeface="Lato"/>
+              </a:defRPr>
+            </a:lvl6pPr>
+            <a:lvl7pPr marL="3200400" marR="0" lvl="6" indent="-298450" algn="l" rtl="0">
+              <a:lnSpc>
+                <a:spcPct val="115000"/>
+              </a:lnSpc>
+              <a:spcBef>
+                <a:spcPts val="1600"/>
+              </a:spcBef>
+              <a:spcAft>
+                <a:spcPts val="0"/>
+              </a:spcAft>
+              <a:buClr>
+                <a:schemeClr val="lt1"/>
+              </a:buClr>
+              <a:buSzPts val="1100"/>
+              <a:buFont typeface="Lato"/>
+              <a:buChar char="●"/>
+              <a:defRPr sz="1100" b="0" i="0" u="none" strike="noStrike" cap="none">
+                <a:solidFill>
+                  <a:schemeClr val="lt1"/>
+                </a:solidFill>
+                <a:latin typeface="Lato"/>
+                <a:ea typeface="Lato"/>
+                <a:cs typeface="Lato"/>
+                <a:sym typeface="Lato"/>
+              </a:defRPr>
+            </a:lvl7pPr>
+            <a:lvl8pPr marL="3657600" marR="0" lvl="7" indent="-298450" algn="l" rtl="0">
+              <a:lnSpc>
+                <a:spcPct val="115000"/>
+              </a:lnSpc>
+              <a:spcBef>
+                <a:spcPts val="1600"/>
+              </a:spcBef>
+              <a:spcAft>
+                <a:spcPts val="0"/>
+              </a:spcAft>
+              <a:buClr>
+                <a:schemeClr val="lt1"/>
+              </a:buClr>
+              <a:buSzPts val="1100"/>
+              <a:buFont typeface="Lato"/>
+              <a:buChar char="○"/>
+              <a:defRPr sz="1100" b="0" i="0" u="none" strike="noStrike" cap="none">
+                <a:solidFill>
+                  <a:schemeClr val="lt1"/>
+                </a:solidFill>
+                <a:latin typeface="Lato"/>
+                <a:ea typeface="Lato"/>
+                <a:cs typeface="Lato"/>
+                <a:sym typeface="Lato"/>
+              </a:defRPr>
+            </a:lvl8pPr>
+            <a:lvl9pPr marL="4114800" marR="0" lvl="8" indent="-298450" algn="l" rtl="0">
+              <a:lnSpc>
+                <a:spcPct val="115000"/>
+              </a:lnSpc>
+              <a:spcBef>
+                <a:spcPts val="1600"/>
+              </a:spcBef>
+              <a:spcAft>
+                <a:spcPts val="1600"/>
+              </a:spcAft>
+              <a:buClr>
+                <a:schemeClr val="lt1"/>
+              </a:buClr>
+              <a:buSzPts val="1100"/>
+              <a:buFont typeface="Lato"/>
+              <a:buChar char="■"/>
+              <a:defRPr sz="1100" b="0" i="0" u="none" strike="noStrike" cap="none">
+                <a:solidFill>
+                  <a:schemeClr val="lt1"/>
+                </a:solidFill>
+                <a:latin typeface="Lato"/>
+                <a:ea typeface="Lato"/>
+                <a:cs typeface="Lato"/>
+                <a:sym typeface="Lato"/>
+              </a:defRPr>
+            </a:lvl9pPr>
+          </a:lstStyle>
+          <a:p>
+            <a:pPr marL="0" indent="0">
+              <a:buFont typeface="Lato"/>
+              <a:buNone/>
+            </a:pPr>
+            <a:r>
+              <a:rPr lang="en-GB" dirty="0" smtClean="0"/>
+              <a:t>Work/ tasks completed this week : </a:t>
+            </a:r>
+          </a:p>
+          <a:p>
+            <a:pPr marL="285750" indent="-285750"/>
+            <a:r>
+              <a:rPr lang="en-GB" dirty="0" smtClean="0"/>
+              <a:t>Animation </a:t>
+            </a:r>
+            <a:r>
+              <a:rPr lang="en-GB" dirty="0" smtClean="0"/>
+              <a:t>fitted to avatar </a:t>
+            </a:r>
+            <a:endParaRPr lang="en-GB" dirty="0" smtClean="0"/>
+          </a:p>
+          <a:p>
+            <a:pPr marL="285750" indent="-285750"/>
+            <a:r>
+              <a:rPr lang="en-GB" dirty="0" smtClean="0"/>
+              <a:t>Personality insights demo created </a:t>
+            </a:r>
+            <a:r>
+              <a:rPr lang="mr-IN" dirty="0" smtClean="0"/>
+              <a:t>–</a:t>
+            </a:r>
+            <a:r>
+              <a:rPr lang="en-GB" dirty="0" smtClean="0"/>
+              <a:t> need way to gather all tweets </a:t>
+            </a:r>
+            <a:endParaRPr lang="en-GB" dirty="0" smtClean="0"/>
+          </a:p>
+        </p:txBody>
+      </p:sp>
+      <p:sp>
+        <p:nvSpPr>
+          <p:cNvPr id="7" name="Shape 166"/>
+          <p:cNvSpPr txBox="1">
+            <a:spLocks/>
+          </p:cNvSpPr>
+          <p:nvPr/>
+        </p:nvSpPr>
+        <p:spPr>
+          <a:xfrm>
+            <a:off x="4468500" y="1307850"/>
+            <a:ext cx="4237200" cy="1559100"/>
+          </a:xfrm>
+          <a:prstGeom prst="rect">
+            <a:avLst/>
+          </a:prstGeom>
+          <a:noFill/>
+          <a:ln>
+            <a:noFill/>
+          </a:ln>
+        </p:spPr>
+        <p:txBody>
+          <a:bodyPr spcFirstLastPara="1" wrap="square" lIns="91425" tIns="91425" rIns="91425" bIns="91425" anchor="t" anchorCtr="0">
+            <a:noAutofit/>
+          </a:bodyPr>
+          <a:lstStyle>
+            <a:defPPr marR="0" lvl="0" algn="l" rtl="0">
+              <a:lnSpc>
+                <a:spcPct val="100000"/>
+              </a:lnSpc>
+              <a:spcBef>
+                <a:spcPts val="0"/>
+              </a:spcBef>
+              <a:spcAft>
+                <a:spcPts val="0"/>
+              </a:spcAft>
+            </a:defPPr>
+            <a:lvl1pPr marL="457200" marR="0" lvl="0" indent="-311150" algn="l" rtl="0">
+              <a:lnSpc>
+                <a:spcPct val="115000"/>
+              </a:lnSpc>
+              <a:spcBef>
+                <a:spcPts val="0"/>
+              </a:spcBef>
+              <a:spcAft>
+                <a:spcPts val="0"/>
+              </a:spcAft>
+              <a:buClr>
+                <a:schemeClr val="lt1"/>
+              </a:buClr>
+              <a:buSzPts val="1300"/>
+              <a:buFont typeface="Lato"/>
+              <a:buChar char="●"/>
+              <a:defRPr sz="1300" b="0" i="0" u="none" strike="noStrike" cap="none">
+                <a:solidFill>
+                  <a:schemeClr val="lt1"/>
+                </a:solidFill>
+                <a:latin typeface="Lato"/>
+                <a:ea typeface="Lato"/>
+                <a:cs typeface="Lato"/>
+                <a:sym typeface="Lato"/>
+              </a:defRPr>
+            </a:lvl1pPr>
+            <a:lvl2pPr marL="914400" marR="0" lvl="1" indent="-298450" algn="l" rtl="0">
+              <a:lnSpc>
+                <a:spcPct val="115000"/>
+              </a:lnSpc>
+              <a:spcBef>
+                <a:spcPts val="1600"/>
+              </a:spcBef>
+              <a:spcAft>
+                <a:spcPts val="0"/>
+              </a:spcAft>
+              <a:buClr>
+                <a:schemeClr val="lt1"/>
+              </a:buClr>
+              <a:buSzPts val="1100"/>
+              <a:buFont typeface="Lato"/>
+              <a:buChar char="○"/>
+              <a:defRPr sz="1100" b="0" i="0" u="none" strike="noStrike" cap="none">
+                <a:solidFill>
+                  <a:schemeClr val="lt1"/>
+                </a:solidFill>
+                <a:latin typeface="Lato"/>
+                <a:ea typeface="Lato"/>
+                <a:cs typeface="Lato"/>
+                <a:sym typeface="Lato"/>
+              </a:defRPr>
+            </a:lvl2pPr>
+            <a:lvl3pPr marL="1371600" marR="0" lvl="2" indent="-298450" algn="l" rtl="0">
+              <a:lnSpc>
+                <a:spcPct val="115000"/>
+              </a:lnSpc>
+              <a:spcBef>
+                <a:spcPts val="1600"/>
+              </a:spcBef>
+              <a:spcAft>
+                <a:spcPts val="0"/>
+              </a:spcAft>
+              <a:buClr>
+                <a:schemeClr val="lt1"/>
+              </a:buClr>
+              <a:buSzPts val="1100"/>
+              <a:buFont typeface="Lato"/>
+              <a:buChar char="■"/>
+              <a:defRPr sz="1100" b="0" i="0" u="none" strike="noStrike" cap="none">
+                <a:solidFill>
+                  <a:schemeClr val="lt1"/>
+                </a:solidFill>
+                <a:latin typeface="Lato"/>
+                <a:ea typeface="Lato"/>
+                <a:cs typeface="Lato"/>
+                <a:sym typeface="Lato"/>
+              </a:defRPr>
+            </a:lvl3pPr>
+            <a:lvl4pPr marL="1828800" marR="0" lvl="3" indent="-298450" algn="l" rtl="0">
+              <a:lnSpc>
+                <a:spcPct val="115000"/>
+              </a:lnSpc>
+              <a:spcBef>
+                <a:spcPts val="1600"/>
+              </a:spcBef>
+              <a:spcAft>
+                <a:spcPts val="0"/>
+              </a:spcAft>
+              <a:buClr>
+                <a:schemeClr val="lt1"/>
+              </a:buClr>
+              <a:buSzPts val="1100"/>
+              <a:buFont typeface="Lato"/>
+              <a:buChar char="●"/>
+              <a:defRPr sz="1100" b="0" i="0" u="none" strike="noStrike" cap="none">
+                <a:solidFill>
+                  <a:schemeClr val="lt1"/>
+                </a:solidFill>
+                <a:latin typeface="Lato"/>
+                <a:ea typeface="Lato"/>
+                <a:cs typeface="Lato"/>
+                <a:sym typeface="Lato"/>
+              </a:defRPr>
+            </a:lvl4pPr>
+            <a:lvl5pPr marL="2286000" marR="0" lvl="4" indent="-298450" algn="l" rtl="0">
+              <a:lnSpc>
+                <a:spcPct val="115000"/>
+              </a:lnSpc>
+              <a:spcBef>
+                <a:spcPts val="1600"/>
+              </a:spcBef>
+              <a:spcAft>
+                <a:spcPts val="0"/>
+              </a:spcAft>
+              <a:buClr>
+                <a:schemeClr val="lt1"/>
+              </a:buClr>
+              <a:buSzPts val="1100"/>
+              <a:buFont typeface="Lato"/>
+              <a:buChar char="○"/>
+              <a:defRPr sz="1100" b="0" i="0" u="none" strike="noStrike" cap="none">
+                <a:solidFill>
+                  <a:schemeClr val="lt1"/>
+                </a:solidFill>
+                <a:latin typeface="Lato"/>
+                <a:ea typeface="Lato"/>
+                <a:cs typeface="Lato"/>
+                <a:sym typeface="Lato"/>
+              </a:defRPr>
+            </a:lvl5pPr>
+            <a:lvl6pPr marL="2743200" marR="0" lvl="5" indent="-298450" algn="l" rtl="0">
+              <a:lnSpc>
+                <a:spcPct val="115000"/>
+              </a:lnSpc>
+              <a:spcBef>
+                <a:spcPts val="1600"/>
+              </a:spcBef>
+              <a:spcAft>
+                <a:spcPts val="0"/>
+              </a:spcAft>
+              <a:buClr>
+                <a:schemeClr val="lt1"/>
+              </a:buClr>
+              <a:buSzPts val="1100"/>
+              <a:buFont typeface="Lato"/>
+              <a:buChar char="■"/>
+              <a:defRPr sz="1100" b="0" i="0" u="none" strike="noStrike" cap="none">
+                <a:solidFill>
+                  <a:schemeClr val="lt1"/>
+                </a:solidFill>
+                <a:latin typeface="Lato"/>
+                <a:ea typeface="Lato"/>
+                <a:cs typeface="Lato"/>
+                <a:sym typeface="Lato"/>
+              </a:defRPr>
+            </a:lvl6pPr>
+            <a:lvl7pPr marL="3200400" marR="0" lvl="6" indent="-298450" algn="l" rtl="0">
+              <a:lnSpc>
+                <a:spcPct val="115000"/>
+              </a:lnSpc>
+              <a:spcBef>
+                <a:spcPts val="1600"/>
+              </a:spcBef>
+              <a:spcAft>
+                <a:spcPts val="0"/>
+              </a:spcAft>
+              <a:buClr>
+                <a:schemeClr val="lt1"/>
+              </a:buClr>
+              <a:buSzPts val="1100"/>
+              <a:buFont typeface="Lato"/>
+              <a:buChar char="●"/>
+              <a:defRPr sz="1100" b="0" i="0" u="none" strike="noStrike" cap="none">
+                <a:solidFill>
+                  <a:schemeClr val="lt1"/>
+                </a:solidFill>
+                <a:latin typeface="Lato"/>
+                <a:ea typeface="Lato"/>
+                <a:cs typeface="Lato"/>
+                <a:sym typeface="Lato"/>
+              </a:defRPr>
+            </a:lvl7pPr>
+            <a:lvl8pPr marL="3657600" marR="0" lvl="7" indent="-298450" algn="l" rtl="0">
+              <a:lnSpc>
+                <a:spcPct val="115000"/>
+              </a:lnSpc>
+              <a:spcBef>
+                <a:spcPts val="1600"/>
+              </a:spcBef>
+              <a:spcAft>
+                <a:spcPts val="0"/>
+              </a:spcAft>
+              <a:buClr>
+                <a:schemeClr val="lt1"/>
+              </a:buClr>
+              <a:buSzPts val="1100"/>
+              <a:buFont typeface="Lato"/>
+              <a:buChar char="○"/>
+              <a:defRPr sz="1100" b="0" i="0" u="none" strike="noStrike" cap="none">
+                <a:solidFill>
+                  <a:schemeClr val="lt1"/>
+                </a:solidFill>
+                <a:latin typeface="Lato"/>
+                <a:ea typeface="Lato"/>
+                <a:cs typeface="Lato"/>
+                <a:sym typeface="Lato"/>
+              </a:defRPr>
+            </a:lvl8pPr>
+            <a:lvl9pPr marL="4114800" marR="0" lvl="8" indent="-298450" algn="l" rtl="0">
+              <a:lnSpc>
+                <a:spcPct val="115000"/>
+              </a:lnSpc>
+              <a:spcBef>
+                <a:spcPts val="1600"/>
+              </a:spcBef>
+              <a:spcAft>
+                <a:spcPts val="1600"/>
+              </a:spcAft>
+              <a:buClr>
+                <a:schemeClr val="lt1"/>
+              </a:buClr>
+              <a:buSzPts val="1100"/>
+              <a:buFont typeface="Lato"/>
+              <a:buChar char="■"/>
+              <a:defRPr sz="1100" b="0" i="0" u="none" strike="noStrike" cap="none">
+                <a:solidFill>
+                  <a:schemeClr val="lt1"/>
+                </a:solidFill>
+                <a:latin typeface="Lato"/>
+                <a:ea typeface="Lato"/>
+                <a:cs typeface="Lato"/>
+                <a:sym typeface="Lato"/>
+              </a:defRPr>
+            </a:lvl9pPr>
+          </a:lstStyle>
+          <a:p>
+            <a:pPr marL="0" indent="0">
+              <a:buFont typeface="Lato"/>
+              <a:buNone/>
+            </a:pPr>
+            <a:r>
+              <a:rPr lang="en-GB" dirty="0" smtClean="0"/>
+              <a:t>Meetings to be held this week: </a:t>
+            </a:r>
+          </a:p>
+          <a:p>
+            <a:pPr marL="0" indent="0">
+              <a:spcBef>
+                <a:spcPts val="1600"/>
+              </a:spcBef>
+              <a:buNone/>
+            </a:pPr>
+            <a:r>
+              <a:rPr lang="en-GB" dirty="0" smtClean="0"/>
+              <a:t>Meeting with </a:t>
+            </a:r>
+            <a:r>
+              <a:rPr lang="en-GB" dirty="0" err="1" smtClean="0"/>
+              <a:t>gail</a:t>
+            </a:r>
+            <a:r>
+              <a:rPr lang="en-GB" dirty="0" smtClean="0"/>
+              <a:t> </a:t>
+            </a:r>
+            <a:r>
+              <a:rPr lang="en-GB" dirty="0"/>
+              <a:t>- 6/03/18</a:t>
+            </a:r>
+            <a:endParaRPr lang="en-GB" dirty="0" smtClean="0"/>
+          </a:p>
+          <a:p>
+            <a:pPr marL="0" indent="0">
+              <a:spcBef>
+                <a:spcPts val="1600"/>
+              </a:spcBef>
+              <a:spcAft>
+                <a:spcPts val="1600"/>
+              </a:spcAft>
+              <a:buFont typeface="Lato"/>
+              <a:buNone/>
+            </a:pPr>
+            <a:endParaRPr lang="en-GB" dirty="0"/>
+          </a:p>
+        </p:txBody>
+      </p:sp>
+      <p:sp>
+        <p:nvSpPr>
+          <p:cNvPr id="8" name="Shape 164"/>
+          <p:cNvSpPr txBox="1">
+            <a:spLocks/>
+          </p:cNvSpPr>
+          <p:nvPr/>
+        </p:nvSpPr>
+        <p:spPr>
+          <a:xfrm>
+            <a:off x="1297500" y="393750"/>
+            <a:ext cx="6868305" cy="914100"/>
+          </a:xfrm>
+          <a:prstGeom prst="rect">
+            <a:avLst/>
+          </a:prstGeom>
+          <a:noFill/>
+          <a:ln>
+            <a:noFill/>
+          </a:ln>
+        </p:spPr>
+        <p:txBody>
+          <a:bodyPr spcFirstLastPara="1" wrap="square" lIns="91425" tIns="91425" rIns="91425" bIns="91425" anchor="t" anchorCtr="0">
+            <a:noAutofit/>
+          </a:bodyPr>
+          <a:lstStyle>
+            <a:defPPr marR="0" lvl="0" algn="l" rtl="0">
+              <a:lnSpc>
+                <a:spcPct val="100000"/>
+              </a:lnSpc>
+              <a:spcBef>
+                <a:spcPts val="0"/>
+              </a:spcBef>
+              <a:spcAft>
+                <a:spcPts val="0"/>
+              </a:spcAft>
+            </a:defPPr>
+            <a:lvl1pPr marR="0" lvl="0" algn="l" rtl="0">
+              <a:lnSpc>
+                <a:spcPct val="100000"/>
+              </a:lnSpc>
+              <a:spcBef>
+                <a:spcPts val="0"/>
+              </a:spcBef>
+              <a:spcAft>
+                <a:spcPts val="0"/>
+              </a:spcAft>
+              <a:buClr>
+                <a:schemeClr val="lt1"/>
+              </a:buClr>
+              <a:buSzPts val="2400"/>
+              <a:buFont typeface="Montserrat"/>
+              <a:buNone/>
+              <a:defRPr sz="2400" b="0" i="0" u="none" strike="noStrike" cap="none">
+                <a:solidFill>
+                  <a:schemeClr val="lt1"/>
+                </a:solidFill>
+                <a:latin typeface="Montserrat"/>
+                <a:ea typeface="Montserrat"/>
+                <a:cs typeface="Montserrat"/>
+                <a:sym typeface="Montserrat"/>
+              </a:defRPr>
+            </a:lvl1pPr>
+            <a:lvl2pPr marR="0" lvl="1" algn="l" rtl="0">
+              <a:lnSpc>
+                <a:spcPct val="100000"/>
+              </a:lnSpc>
+              <a:spcBef>
+                <a:spcPts val="0"/>
+              </a:spcBef>
+              <a:spcAft>
+                <a:spcPts val="0"/>
+              </a:spcAft>
+              <a:buClr>
+                <a:schemeClr val="lt1"/>
+              </a:buClr>
+              <a:buSzPts val="2400"/>
+              <a:buFont typeface="Montserrat"/>
+              <a:buNone/>
+              <a:defRPr sz="2400" b="0" i="0" u="none" strike="noStrike" cap="none">
+                <a:solidFill>
+                  <a:schemeClr val="lt1"/>
+                </a:solidFill>
+                <a:latin typeface="Montserrat"/>
+                <a:ea typeface="Montserrat"/>
+                <a:cs typeface="Montserrat"/>
+                <a:sym typeface="Montserrat"/>
+              </a:defRPr>
+            </a:lvl2pPr>
+            <a:lvl3pPr marR="0" lvl="2" algn="l" rtl="0">
+              <a:lnSpc>
+                <a:spcPct val="100000"/>
+              </a:lnSpc>
+              <a:spcBef>
+                <a:spcPts val="0"/>
+              </a:spcBef>
+              <a:spcAft>
+                <a:spcPts val="0"/>
+              </a:spcAft>
+              <a:buClr>
+                <a:schemeClr val="lt1"/>
+              </a:buClr>
+              <a:buSzPts val="2400"/>
+              <a:buFont typeface="Montserrat"/>
+              <a:buNone/>
+              <a:defRPr sz="2400" b="0" i="0" u="none" strike="noStrike" cap="none">
+                <a:solidFill>
+                  <a:schemeClr val="lt1"/>
+                </a:solidFill>
+                <a:latin typeface="Montserrat"/>
+                <a:ea typeface="Montserrat"/>
+                <a:cs typeface="Montserrat"/>
+                <a:sym typeface="Montserrat"/>
+              </a:defRPr>
+            </a:lvl3pPr>
+            <a:lvl4pPr marR="0" lvl="3" algn="l" rtl="0">
+              <a:lnSpc>
+                <a:spcPct val="100000"/>
+              </a:lnSpc>
+              <a:spcBef>
+                <a:spcPts val="0"/>
+              </a:spcBef>
+              <a:spcAft>
+                <a:spcPts val="0"/>
+              </a:spcAft>
+              <a:buClr>
+                <a:schemeClr val="lt1"/>
+              </a:buClr>
+              <a:buSzPts val="2400"/>
+              <a:buFont typeface="Montserrat"/>
+              <a:buNone/>
+              <a:defRPr sz="2400" b="0" i="0" u="none" strike="noStrike" cap="none">
+                <a:solidFill>
+                  <a:schemeClr val="lt1"/>
+                </a:solidFill>
+                <a:latin typeface="Montserrat"/>
+                <a:ea typeface="Montserrat"/>
+                <a:cs typeface="Montserrat"/>
+                <a:sym typeface="Montserrat"/>
+              </a:defRPr>
+            </a:lvl4pPr>
+            <a:lvl5pPr marR="0" lvl="4" algn="l" rtl="0">
+              <a:lnSpc>
+                <a:spcPct val="100000"/>
+              </a:lnSpc>
+              <a:spcBef>
+                <a:spcPts val="0"/>
+              </a:spcBef>
+              <a:spcAft>
+                <a:spcPts val="0"/>
+              </a:spcAft>
+              <a:buClr>
+                <a:schemeClr val="lt1"/>
+              </a:buClr>
+              <a:buSzPts val="2400"/>
+              <a:buFont typeface="Montserrat"/>
+              <a:buNone/>
+              <a:defRPr sz="2400" b="0" i="0" u="none" strike="noStrike" cap="none">
+                <a:solidFill>
+                  <a:schemeClr val="lt1"/>
+                </a:solidFill>
+                <a:latin typeface="Montserrat"/>
+                <a:ea typeface="Montserrat"/>
+                <a:cs typeface="Montserrat"/>
+                <a:sym typeface="Montserrat"/>
+              </a:defRPr>
+            </a:lvl5pPr>
+            <a:lvl6pPr marR="0" lvl="5" algn="l" rtl="0">
+              <a:lnSpc>
+                <a:spcPct val="100000"/>
+              </a:lnSpc>
+              <a:spcBef>
+                <a:spcPts val="0"/>
+              </a:spcBef>
+              <a:spcAft>
+                <a:spcPts val="0"/>
+              </a:spcAft>
+              <a:buClr>
+                <a:schemeClr val="lt1"/>
+              </a:buClr>
+              <a:buSzPts val="2400"/>
+              <a:buFont typeface="Montserrat"/>
+              <a:buNone/>
+              <a:defRPr sz="2400" b="0" i="0" u="none" strike="noStrike" cap="none">
+                <a:solidFill>
+                  <a:schemeClr val="lt1"/>
+                </a:solidFill>
+                <a:latin typeface="Montserrat"/>
+                <a:ea typeface="Montserrat"/>
+                <a:cs typeface="Montserrat"/>
+                <a:sym typeface="Montserrat"/>
+              </a:defRPr>
+            </a:lvl6pPr>
+            <a:lvl7pPr marR="0" lvl="6" algn="l" rtl="0">
+              <a:lnSpc>
+                <a:spcPct val="100000"/>
+              </a:lnSpc>
+              <a:spcBef>
+                <a:spcPts val="0"/>
+              </a:spcBef>
+              <a:spcAft>
+                <a:spcPts val="0"/>
+              </a:spcAft>
+              <a:buClr>
+                <a:schemeClr val="lt1"/>
+              </a:buClr>
+              <a:buSzPts val="2400"/>
+              <a:buFont typeface="Montserrat"/>
+              <a:buNone/>
+              <a:defRPr sz="2400" b="0" i="0" u="none" strike="noStrike" cap="none">
+                <a:solidFill>
+                  <a:schemeClr val="lt1"/>
+                </a:solidFill>
+                <a:latin typeface="Montserrat"/>
+                <a:ea typeface="Montserrat"/>
+                <a:cs typeface="Montserrat"/>
+                <a:sym typeface="Montserrat"/>
+              </a:defRPr>
+            </a:lvl7pPr>
+            <a:lvl8pPr marR="0" lvl="7" algn="l" rtl="0">
+              <a:lnSpc>
+                <a:spcPct val="100000"/>
+              </a:lnSpc>
+              <a:spcBef>
+                <a:spcPts val="0"/>
+              </a:spcBef>
+              <a:spcAft>
+                <a:spcPts val="0"/>
+              </a:spcAft>
+              <a:buClr>
+                <a:schemeClr val="lt1"/>
+              </a:buClr>
+              <a:buSzPts val="2400"/>
+              <a:buFont typeface="Montserrat"/>
+              <a:buNone/>
+              <a:defRPr sz="2400" b="0" i="0" u="none" strike="noStrike" cap="none">
+                <a:solidFill>
+                  <a:schemeClr val="lt1"/>
+                </a:solidFill>
+                <a:latin typeface="Montserrat"/>
+                <a:ea typeface="Montserrat"/>
+                <a:cs typeface="Montserrat"/>
+                <a:sym typeface="Montserrat"/>
+              </a:defRPr>
+            </a:lvl8pPr>
+            <a:lvl9pPr marR="0" lvl="8" algn="l" rtl="0">
+              <a:lnSpc>
+                <a:spcPct val="100000"/>
+              </a:lnSpc>
+              <a:spcBef>
+                <a:spcPts val="0"/>
+              </a:spcBef>
+              <a:spcAft>
+                <a:spcPts val="0"/>
+              </a:spcAft>
+              <a:buClr>
+                <a:schemeClr val="lt1"/>
+              </a:buClr>
+              <a:buSzPts val="2400"/>
+              <a:buFont typeface="Montserrat"/>
+              <a:buNone/>
+              <a:defRPr sz="2400" b="0" i="0" u="none" strike="noStrike" cap="none">
+                <a:solidFill>
+                  <a:schemeClr val="lt1"/>
+                </a:solidFill>
+                <a:latin typeface="Montserrat"/>
+                <a:ea typeface="Montserrat"/>
+                <a:cs typeface="Montserrat"/>
+                <a:sym typeface="Montserrat"/>
+              </a:defRPr>
+            </a:lvl9pPr>
+          </a:lstStyle>
+          <a:p>
+            <a:r>
+              <a:rPr lang="en-US" dirty="0" err="1" smtClean="0"/>
+              <a:t>Wk</a:t>
+            </a:r>
+            <a:r>
+              <a:rPr lang="en-US" dirty="0" smtClean="0"/>
+              <a:t> beginning : </a:t>
+            </a:r>
+            <a:r>
+              <a:rPr lang="en-US" dirty="0" smtClean="0"/>
+              <a:t>05</a:t>
+            </a:r>
+            <a:r>
+              <a:rPr lang="en-US" dirty="0" smtClean="0"/>
+              <a:t>/03/18</a:t>
+            </a:r>
+            <a:endParaRPr lang="en-US" dirty="0"/>
+          </a:p>
+        </p:txBody>
+      </p:sp>
+    </p:spTree>
+    <p:extLst>
+      <p:ext uri="{BB962C8B-B14F-4D97-AF65-F5344CB8AC3E}">
+        <p14:creationId xmlns:p14="http://schemas.microsoft.com/office/powerpoint/2010/main" val="633732650"/>
+      </p:ext>
+    </p:extLst>
+  </p:cSld>
+  <p:clrMapOvr>
+    <a:masterClrMapping/>
+  </p:clrMapOvr>
+</p:sld>
+</file>
+
+<file path=ppt/slides/slide8.xml><?xml version="1.0" encoding="utf-8"?>
 <p:sld xmlns:a="http://schemas.openxmlformats.org/drawingml/2006/main" xmlns:r="http://schemas.openxmlformats.org/officeDocument/2006/relationships" xmlns:p="http://schemas.openxmlformats.org/presentationml/2006/main">
   <p:cSld>
     <p:spTree>
@@ -12338,7 +13636,7 @@
             </a:r>
             <a:r>
               <a:rPr lang="en-GB" dirty="0" smtClean="0"/>
-              <a:t>5</a:t>
+              <a:t>12</a:t>
             </a:r>
             <a:r>
               <a:rPr lang="en-GB" dirty="0" smtClean="0"/>
@@ -12777,7 +14075,7 @@
             </a:pPr>
             <a:r>
               <a:rPr lang="en-GB" dirty="0" smtClean="0"/>
-              <a:t>Group meetings - 22/02/18			     </a:t>
+              <a:t>Group meetings - 			     </a:t>
             </a:r>
           </a:p>
           <a:p>
@@ -13096,6 +14394,64 @@
     <p:extLst>
       <p:ext uri="{BB962C8B-B14F-4D97-AF65-F5344CB8AC3E}">
         <p14:creationId xmlns:p14="http://schemas.microsoft.com/office/powerpoint/2010/main" val="1709425218"/>
+      </p:ext>
+    </p:extLst>
+  </p:cSld>
+  <p:clrMapOvr>
+    <a:masterClrMapping/>
+  </p:clrMapOvr>
+</p:sld>
+</file>
+
+<file path=ppt/slides/slide9.xml><?xml version="1.0" encoding="utf-8"?>
+<p:sld xmlns:a="http://schemas.openxmlformats.org/drawingml/2006/main" xmlns:r="http://schemas.openxmlformats.org/officeDocument/2006/relationships" xmlns:p="http://schemas.openxmlformats.org/presentationml/2006/main">
+  <p:cSld>
+    <p:spTree>
+      <p:nvGrpSpPr>
+        <p:cNvPr id="1" name=""/>
+        <p:cNvGrpSpPr/>
+        <p:nvPr/>
+      </p:nvGrpSpPr>
+      <p:grpSpPr>
+        <a:xfrm>
+          <a:off x="0" y="0"/>
+          <a:ext cx="0" cy="0"/>
+          <a:chOff x="0" y="0"/>
+          <a:chExt cx="0" cy="0"/>
+        </a:xfrm>
+      </p:grpSpPr>
+      <p:sp>
+        <p:nvSpPr>
+          <p:cNvPr id="2" name="Title 1"/>
+          <p:cNvSpPr>
+            <a:spLocks noGrp="1"/>
+          </p:cNvSpPr>
+          <p:nvPr>
+            <p:ph type="title"/>
+          </p:nvPr>
+        </p:nvSpPr>
+        <p:spPr>
+          <a:xfrm>
+            <a:off x="797443" y="1595230"/>
+            <a:ext cx="7730344" cy="914100"/>
+          </a:xfrm>
+        </p:spPr>
+        <p:txBody>
+          <a:bodyPr/>
+          <a:lstStyle/>
+          <a:p>
+            <a:r>
+              <a:rPr lang="en-US" sz="11500" dirty="0" smtClean="0"/>
+              <a:t>Easter Break</a:t>
+            </a:r>
+            <a:endParaRPr lang="en-US" sz="11500" dirty="0"/>
+          </a:p>
+        </p:txBody>
+      </p:sp>
+    </p:spTree>
+    <p:extLst>
+      <p:ext uri="{BB962C8B-B14F-4D97-AF65-F5344CB8AC3E}">
+        <p14:creationId xmlns:p14="http://schemas.microsoft.com/office/powerpoint/2010/main" val="572507641"/>
       </p:ext>
     </p:extLst>
   </p:cSld>

</xml_diff>